<commit_message>
Update auf 3 Runden zum vorzeigen
</commit_message>
<xml_diff>
--- a/Abschlussprojekt-BLJ-Finish-This-Levi.pptx
+++ b/Abschlussprojekt-BLJ-Finish-This-Levi.pptx
@@ -5,34 +5,33 @@
     <p:sldMasterId id="2147483648" r:id="rId1"/>
   </p:sldMasterIdLst>
   <p:notesMasterIdLst>
-    <p:notesMasterId r:id="rId12"/>
+    <p:notesMasterId r:id="rId11"/>
   </p:notesMasterIdLst>
   <p:sldIdLst>
     <p:sldId id="256" r:id="rId2"/>
     <p:sldId id="257" r:id="rId3"/>
     <p:sldId id="258" r:id="rId4"/>
     <p:sldId id="259" r:id="rId5"/>
-    <p:sldId id="260" r:id="rId6"/>
-    <p:sldId id="261" r:id="rId7"/>
-    <p:sldId id="262" r:id="rId8"/>
-    <p:sldId id="263" r:id="rId9"/>
-    <p:sldId id="264" r:id="rId10"/>
-    <p:sldId id="265" r:id="rId11"/>
+    <p:sldId id="261" r:id="rId6"/>
+    <p:sldId id="262" r:id="rId7"/>
+    <p:sldId id="263" r:id="rId8"/>
+    <p:sldId id="264" r:id="rId9"/>
+    <p:sldId id="265" r:id="rId10"/>
   </p:sldIdLst>
   <p:sldSz cx="14630400" cy="8229600"/>
   <p:notesSz cx="8229600" cy="14630400"/>
   <p:embeddedFontLst>
     <p:embeddedFont>
       <p:font typeface="Bricolage Grotesque Extra Bold" panose="020B0604020202020204" charset="0"/>
+      <p:regular r:id="rId12"/>
+    </p:embeddedFont>
+    <p:embeddedFont>
+      <p:font typeface="Montserrat" panose="00000500000000000000" pitchFamily="2" charset="0"/>
       <p:regular r:id="rId13"/>
     </p:embeddedFont>
     <p:embeddedFont>
-      <p:font typeface="Montserrat" panose="00000500000000000000" pitchFamily="2" charset="0"/>
-      <p:regular r:id="rId14"/>
-    </p:embeddedFont>
-    <p:embeddedFont>
       <p:font typeface="Montserrat Bold" panose="020B0604020202020204" charset="0"/>
-      <p:bold r:id="rId15"/>
+      <p:bold r:id="rId14"/>
     </p:embeddedFont>
   </p:embeddedFontLst>
   <p:defaultTextStyle>
@@ -347,114 +346,6 @@
 </p:notes>
 </file>
 
-<file path=ppt/notesSlides/notesSlide10.xml><?xml version="1.0" encoding="utf-8"?>
-<p:notes xmlns:a="http://schemas.openxmlformats.org/drawingml/2006/main" xmlns:r="http://schemas.openxmlformats.org/officeDocument/2006/relationships" xmlns:p="http://schemas.openxmlformats.org/presentationml/2006/main">
-  <p:cSld>
-    <p:spTree>
-      <p:nvGrpSpPr>
-        <p:cNvPr id="1" name="">
-          <a:extLst>
-            <a:ext uri="{FF2B5EF4-FFF2-40B4-BE49-F238E27FC236}">
-              <a16:creationId xmlns:a16="http://schemas.microsoft.com/office/drawing/2014/main" id="{16E8EC34-2CEF-CDD0-3421-B3877FD52C32}"/>
-            </a:ext>
-          </a:extLst>
-        </p:cNvPr>
-        <p:cNvGrpSpPr/>
-        <p:nvPr/>
-      </p:nvGrpSpPr>
-      <p:grpSpPr>
-        <a:xfrm>
-          <a:off x="0" y="0"/>
-          <a:ext cx="0" cy="0"/>
-          <a:chOff x="0" y="0"/>
-          <a:chExt cx="0" cy="0"/>
-        </a:xfrm>
-      </p:grpSpPr>
-      <p:sp>
-        <p:nvSpPr>
-          <p:cNvPr id="2" name="Slide Image Placeholder 1">
-            <a:extLst>
-              <a:ext uri="{FF2B5EF4-FFF2-40B4-BE49-F238E27FC236}">
-                <a16:creationId xmlns:a16="http://schemas.microsoft.com/office/drawing/2014/main" id="{F977E96C-55FF-949D-B2AA-181FCD3ECACD}"/>
-              </a:ext>
-            </a:extLst>
-          </p:cNvPr>
-          <p:cNvSpPr>
-            <a:spLocks noGrp="1" noRot="1" noChangeAspect="1"/>
-          </p:cNvSpPr>
-          <p:nvPr>
-            <p:ph type="sldImg"/>
-          </p:nvPr>
-        </p:nvSpPr>
-        <p:spPr/>
-      </p:sp>
-      <p:sp>
-        <p:nvSpPr>
-          <p:cNvPr id="3" name="Notes Placeholder 2">
-            <a:extLst>
-              <a:ext uri="{FF2B5EF4-FFF2-40B4-BE49-F238E27FC236}">
-                <a16:creationId xmlns:a16="http://schemas.microsoft.com/office/drawing/2014/main" id="{D4F38B81-8276-478B-AB90-A2D155B17312}"/>
-              </a:ext>
-            </a:extLst>
-          </p:cNvPr>
-          <p:cNvSpPr>
-            <a:spLocks noGrp="1"/>
-          </p:cNvSpPr>
-          <p:nvPr>
-            <p:ph type="body" idx="1"/>
-          </p:nvPr>
-        </p:nvSpPr>
-        <p:spPr/>
-        <p:txBody>
-          <a:bodyPr/>
-          <a:lstStyle/>
-          <a:p>
-            <a:endParaRPr lang="en-US" dirty="0"/>
-          </a:p>
-        </p:txBody>
-      </p:sp>
-      <p:sp>
-        <p:nvSpPr>
-          <p:cNvPr id="4" name="Slide Number Placeholder 3">
-            <a:extLst>
-              <a:ext uri="{FF2B5EF4-FFF2-40B4-BE49-F238E27FC236}">
-                <a16:creationId xmlns:a16="http://schemas.microsoft.com/office/drawing/2014/main" id="{B67CAC35-38D8-E723-9973-6415BEA2AF53}"/>
-              </a:ext>
-            </a:extLst>
-          </p:cNvPr>
-          <p:cNvSpPr>
-            <a:spLocks noGrp="1"/>
-          </p:cNvSpPr>
-          <p:nvPr>
-            <p:ph type="sldNum" sz="quarter" idx="10"/>
-          </p:nvPr>
-        </p:nvSpPr>
-        <p:spPr/>
-        <p:txBody>
-          <a:bodyPr/>
-          <a:lstStyle/>
-          <a:p>
-            <a:fld id="{F7021451-1387-4CA6-816F-3879F97B5CBC}" type="slidenum">
-              <a:rPr lang="en-US"/>
-              <a:t>10</a:t>
-            </a:fld>
-            <a:endParaRPr lang="en-US"/>
-          </a:p>
-        </p:txBody>
-      </p:sp>
-    </p:spTree>
-    <p:extLst>
-      <p:ext uri="{BB962C8B-B14F-4D97-AF65-F5344CB8AC3E}">
-        <p14:creationId xmlns:p14="http://schemas.microsoft.com/office/powerpoint/2010/main" val="3887086572"/>
-      </p:ext>
-    </p:extLst>
-  </p:cSld>
-  <p:clrMapOvr>
-    <a:masterClrMapping/>
-  </p:clrMapOvr>
-</p:notes>
-</file>
-
 <file path=ppt/notesSlides/notesSlide2.xml><?xml version="1.0" encoding="utf-8"?>
 <p:notes xmlns:a="http://schemas.openxmlformats.org/drawingml/2006/main" xmlns:r="http://schemas.openxmlformats.org/officeDocument/2006/relationships" xmlns:p="http://schemas.openxmlformats.org/presentationml/2006/main">
   <p:cSld>
@@ -1048,7 +939,13 @@
   <p:cSld>
     <p:spTree>
       <p:nvGrpSpPr>
-        <p:cNvPr id="1" name=""/>
+        <p:cNvPr id="1" name="">
+          <a:extLst>
+            <a:ext uri="{FF2B5EF4-FFF2-40B4-BE49-F238E27FC236}">
+              <a16:creationId xmlns:a16="http://schemas.microsoft.com/office/drawing/2014/main" id="{16E8EC34-2CEF-CDD0-3421-B3877FD52C32}"/>
+            </a:ext>
+          </a:extLst>
+        </p:cNvPr>
         <p:cNvGrpSpPr/>
         <p:nvPr/>
       </p:nvGrpSpPr>
@@ -1062,7 +959,13 @@
       </p:grpSpPr>
       <p:sp>
         <p:nvSpPr>
-          <p:cNvPr id="2" name="Slide Image Placeholder 1"/>
+          <p:cNvPr id="2" name="Slide Image Placeholder 1">
+            <a:extLst>
+              <a:ext uri="{FF2B5EF4-FFF2-40B4-BE49-F238E27FC236}">
+                <a16:creationId xmlns:a16="http://schemas.microsoft.com/office/drawing/2014/main" id="{F977E96C-55FF-949D-B2AA-181FCD3ECACD}"/>
+              </a:ext>
+            </a:extLst>
+          </p:cNvPr>
           <p:cNvSpPr>
             <a:spLocks noGrp="1" noRot="1" noChangeAspect="1"/>
           </p:cNvSpPr>
@@ -1074,7 +977,13 @@
       </p:sp>
       <p:sp>
         <p:nvSpPr>
-          <p:cNvPr id="3" name="Notes Placeholder 2"/>
+          <p:cNvPr id="3" name="Notes Placeholder 2">
+            <a:extLst>
+              <a:ext uri="{FF2B5EF4-FFF2-40B4-BE49-F238E27FC236}">
+                <a16:creationId xmlns:a16="http://schemas.microsoft.com/office/drawing/2014/main" id="{D4F38B81-8276-478B-AB90-A2D155B17312}"/>
+              </a:ext>
+            </a:extLst>
+          </p:cNvPr>
           <p:cNvSpPr>
             <a:spLocks noGrp="1"/>
           </p:cNvSpPr>
@@ -1093,7 +1002,13 @@
       </p:sp>
       <p:sp>
         <p:nvSpPr>
-          <p:cNvPr id="4" name="Slide Number Placeholder 3"/>
+          <p:cNvPr id="4" name="Slide Number Placeholder 3">
+            <a:extLst>
+              <a:ext uri="{FF2B5EF4-FFF2-40B4-BE49-F238E27FC236}">
+                <a16:creationId xmlns:a16="http://schemas.microsoft.com/office/drawing/2014/main" id="{B67CAC35-38D8-E723-9973-6415BEA2AF53}"/>
+              </a:ext>
+            </a:extLst>
+          </p:cNvPr>
           <p:cNvSpPr>
             <a:spLocks noGrp="1"/>
           </p:cNvSpPr>
@@ -1117,7 +1032,7 @@
     </p:spTree>
     <p:extLst>
       <p:ext uri="{BB962C8B-B14F-4D97-AF65-F5344CB8AC3E}">
-        <p14:creationId xmlns:p14="http://schemas.microsoft.com/office/powerpoint/2010/main" val="1024086991"/>
+        <p14:creationId xmlns:p14="http://schemas.microsoft.com/office/powerpoint/2010/main" val="3887086572"/>
       </p:ext>
     </p:extLst>
   </p:cSld>
@@ -2208,234 +2123,6 @@
 </p:sld>
 </file>
 
-<file path=ppt/slides/slide10.xml><?xml version="1.0" encoding="utf-8"?>
-<p:sld xmlns:a="http://schemas.openxmlformats.org/drawingml/2006/main" xmlns:r="http://schemas.openxmlformats.org/officeDocument/2006/relationships" xmlns:p="http://schemas.openxmlformats.org/presentationml/2006/main">
-  <p:cSld>
-    <p:spTree>
-      <p:nvGrpSpPr>
-        <p:cNvPr id="1" name="">
-          <a:extLst>
-            <a:ext uri="{FF2B5EF4-FFF2-40B4-BE49-F238E27FC236}">
-              <a16:creationId xmlns:a16="http://schemas.microsoft.com/office/drawing/2014/main" id="{A6A7A71E-71AA-15CC-763F-4E1C0CFBA3AA}"/>
-            </a:ext>
-          </a:extLst>
-        </p:cNvPr>
-        <p:cNvGrpSpPr/>
-        <p:nvPr/>
-      </p:nvGrpSpPr>
-      <p:grpSpPr>
-        <a:xfrm>
-          <a:off x="0" y="0"/>
-          <a:ext cx="0" cy="0"/>
-          <a:chOff x="0" y="0"/>
-          <a:chExt cx="0" cy="0"/>
-        </a:xfrm>
-      </p:grpSpPr>
-      <p:pic>
-        <p:nvPicPr>
-          <p:cNvPr id="2" name="Image 0" descr="preencoded.png">
-            <a:extLst>
-              <a:ext uri="{FF2B5EF4-FFF2-40B4-BE49-F238E27FC236}">
-                <a16:creationId xmlns:a16="http://schemas.microsoft.com/office/drawing/2014/main" id="{AAA44F12-4B81-B4B2-2A73-0731C4FB3F5D}"/>
-              </a:ext>
-            </a:extLst>
-          </p:cNvPr>
-          <p:cNvPicPr>
-            <a:picLocks noChangeAspect="1"/>
-          </p:cNvPicPr>
-          <p:nvPr/>
-        </p:nvPicPr>
-        <p:blipFill>
-          <a:blip r:embed="rId3"/>
-          <a:stretch>
-            <a:fillRect/>
-          </a:stretch>
-        </p:blipFill>
-        <p:spPr>
-          <a:xfrm>
-            <a:off x="0" y="0"/>
-            <a:ext cx="5760720" cy="8229600"/>
-          </a:xfrm>
-          <a:prstGeom prst="rect">
-            <a:avLst/>
-          </a:prstGeom>
-        </p:spPr>
-      </p:pic>
-      <p:sp>
-        <p:nvSpPr>
-          <p:cNvPr id="3" name="Text 0">
-            <a:extLst>
-              <a:ext uri="{FF2B5EF4-FFF2-40B4-BE49-F238E27FC236}">
-                <a16:creationId xmlns:a16="http://schemas.microsoft.com/office/drawing/2014/main" id="{E59F3CA9-B99C-3455-C38E-116BC05ED180}"/>
-              </a:ext>
-            </a:extLst>
-          </p:cNvPr>
-          <p:cNvSpPr/>
-          <p:nvPr/>
-        </p:nvSpPr>
-        <p:spPr>
-          <a:xfrm>
-            <a:off x="5760720" y="3567639"/>
-            <a:ext cx="8898850" cy="2126337"/>
-          </a:xfrm>
-          <a:prstGeom prst="rect">
-            <a:avLst/>
-          </a:prstGeom>
-          <a:noFill/>
-          <a:ln/>
-        </p:spPr>
-        <p:txBody>
-          <a:bodyPr wrap="square" lIns="0" tIns="0" rIns="0" bIns="0" rtlCol="0" anchor="t"/>
-          <a:lstStyle/>
-          <a:p>
-            <a:pPr marL="0" indent="0" algn="l">
-              <a:lnSpc>
-                <a:spcPts val="5550"/>
-              </a:lnSpc>
-              <a:buNone/>
-            </a:pPr>
-            <a:r>
-              <a:rPr lang="en-US" sz="4450" b="1" dirty="0">
-                <a:solidFill>
-                  <a:srgbClr val="EEAEF6"/>
-                </a:solidFill>
-                <a:latin typeface="Bricolage Grotesque Extra Bold" pitchFamily="34" charset="0"/>
-                <a:ea typeface="Bricolage Grotesque Extra Bold" pitchFamily="34" charset="-122"/>
-                <a:cs typeface="Bricolage Grotesque Extra Bold" pitchFamily="34" charset="-120"/>
-              </a:rPr>
-              <a:t>Danke für </a:t>
-            </a:r>
-            <a:r>
-              <a:rPr lang="en-US" sz="4450" b="1" dirty="0" err="1">
-                <a:solidFill>
-                  <a:srgbClr val="EEAEF6"/>
-                </a:solidFill>
-                <a:latin typeface="Bricolage Grotesque Extra Bold" pitchFamily="34" charset="0"/>
-                <a:ea typeface="Bricolage Grotesque Extra Bold" pitchFamily="34" charset="-122"/>
-                <a:cs typeface="Bricolage Grotesque Extra Bold" pitchFamily="34" charset="-120"/>
-              </a:rPr>
-              <a:t>eure</a:t>
-            </a:r>
-            <a:r>
-              <a:rPr lang="en-US" sz="4450" b="1" dirty="0">
-                <a:solidFill>
-                  <a:srgbClr val="EEAEF6"/>
-                </a:solidFill>
-                <a:latin typeface="Bricolage Grotesque Extra Bold" pitchFamily="34" charset="0"/>
-                <a:ea typeface="Bricolage Grotesque Extra Bold" pitchFamily="34" charset="-122"/>
-                <a:cs typeface="Bricolage Grotesque Extra Bold" pitchFamily="34" charset="-120"/>
-              </a:rPr>
-              <a:t> </a:t>
-            </a:r>
-            <a:r>
-              <a:rPr lang="en-US" sz="4450" b="1" dirty="0" err="1">
-                <a:solidFill>
-                  <a:srgbClr val="EEAEF6"/>
-                </a:solidFill>
-                <a:latin typeface="Bricolage Grotesque Extra Bold" pitchFamily="34" charset="0"/>
-                <a:ea typeface="Bricolage Grotesque Extra Bold" pitchFamily="34" charset="-122"/>
-                <a:cs typeface="Bricolage Grotesque Extra Bold" pitchFamily="34" charset="-120"/>
-              </a:rPr>
-              <a:t>Aufmerksamkeit</a:t>
-            </a:r>
-            <a:r>
-              <a:rPr lang="en-US" sz="4450" b="1" dirty="0">
-                <a:solidFill>
-                  <a:srgbClr val="EEAEF6"/>
-                </a:solidFill>
-                <a:latin typeface="Bricolage Grotesque Extra Bold" pitchFamily="34" charset="0"/>
-                <a:ea typeface="Bricolage Grotesque Extra Bold" pitchFamily="34" charset="-122"/>
-                <a:cs typeface="Bricolage Grotesque Extra Bold" pitchFamily="34" charset="-120"/>
-              </a:rPr>
-              <a:t> </a:t>
-            </a:r>
-            <a:r>
-              <a:rPr lang="de-CH" sz="4450" b="1" dirty="0">
-                <a:solidFill>
-                  <a:srgbClr val="EEAEF6"/>
-                </a:solidFill>
-                <a:latin typeface="Bricolage Grotesque Extra Bold" pitchFamily="34" charset="0"/>
-                <a:ea typeface="Bricolage Grotesque Extra Bold" pitchFamily="34" charset="-122"/>
-                <a:cs typeface="Bricolage Grotesque Extra Bold" pitchFamily="34" charset="-120"/>
-              </a:rPr>
-              <a:t>!</a:t>
-            </a:r>
-            <a:endParaRPr lang="en-US" sz="4450" dirty="0"/>
-          </a:p>
-        </p:txBody>
-      </p:sp>
-      <p:sp>
-        <p:nvSpPr>
-          <p:cNvPr id="4" name="Text 1">
-            <a:extLst>
-              <a:ext uri="{FF2B5EF4-FFF2-40B4-BE49-F238E27FC236}">
-                <a16:creationId xmlns:a16="http://schemas.microsoft.com/office/drawing/2014/main" id="{5F094045-6829-BA45-6581-DFE8681D323C}"/>
-              </a:ext>
-            </a:extLst>
-          </p:cNvPr>
-          <p:cNvSpPr/>
-          <p:nvPr/>
-        </p:nvSpPr>
-        <p:spPr>
-          <a:xfrm>
-            <a:off x="9283272" y="4267904"/>
-            <a:ext cx="7556421" cy="362903"/>
-          </a:xfrm>
-          <a:prstGeom prst="rect">
-            <a:avLst/>
-          </a:prstGeom>
-          <a:noFill/>
-          <a:ln/>
-        </p:spPr>
-        <p:txBody>
-          <a:bodyPr wrap="none" lIns="0" tIns="0" rIns="0" bIns="0" rtlCol="0" anchor="t"/>
-          <a:lstStyle/>
-          <a:p>
-            <a:pPr marL="0" indent="0" algn="l">
-              <a:lnSpc>
-                <a:spcPts val="2850"/>
-              </a:lnSpc>
-              <a:buNone/>
-            </a:pPr>
-            <a:r>
-              <a:rPr lang="en-US" sz="1750" dirty="0" err="1">
-                <a:solidFill>
-                  <a:srgbClr val="E5DCE6"/>
-                </a:solidFill>
-                <a:latin typeface="Montserrat" pitchFamily="34" charset="0"/>
-                <a:ea typeface="Montserrat" pitchFamily="34" charset="-122"/>
-                <a:cs typeface="Montserrat" pitchFamily="34" charset="-120"/>
-              </a:rPr>
-              <a:t>Fragen</a:t>
-            </a:r>
-            <a:r>
-              <a:rPr lang="en-US" sz="1750" dirty="0">
-                <a:solidFill>
-                  <a:srgbClr val="E5DCE6"/>
-                </a:solidFill>
-                <a:latin typeface="Montserrat" pitchFamily="34" charset="0"/>
-                <a:ea typeface="Montserrat" pitchFamily="34" charset="-122"/>
-                <a:cs typeface="Montserrat" pitchFamily="34" charset="-120"/>
-              </a:rPr>
-              <a:t>?</a:t>
-            </a:r>
-            <a:endParaRPr lang="en-US" sz="1750" dirty="0"/>
-          </a:p>
-        </p:txBody>
-      </p:sp>
-    </p:spTree>
-    <p:extLst>
-      <p:ext uri="{BB962C8B-B14F-4D97-AF65-F5344CB8AC3E}">
-        <p14:creationId xmlns:p14="http://schemas.microsoft.com/office/powerpoint/2010/main" val="876237768"/>
-      </p:ext>
-    </p:extLst>
-  </p:cSld>
-  <p:clrMapOvr>
-    <a:masterClrMapping/>
-  </p:clrMapOvr>
-</p:sld>
-</file>
-
 <file path=ppt/slides/slide2.xml><?xml version="1.0" encoding="utf-8"?>
 <p:sld xmlns:a="http://schemas.openxmlformats.org/drawingml/2006/main" xmlns:r="http://schemas.openxmlformats.org/officeDocument/2006/relationships" xmlns:p="http://schemas.openxmlformats.org/presentationml/2006/main">
   <p:cSld name="Slide 2">
@@ -2583,13 +2270,13 @@
       </p:sp>
       <p:sp>
         <p:nvSpPr>
-          <p:cNvPr id="5" name="Text 3"/>
-          <p:cNvSpPr/>
-          <p:nvPr/>
-        </p:nvSpPr>
-        <p:spPr>
-          <a:xfrm>
-            <a:off x="793790" y="4072295"/>
+          <p:cNvPr id="6" name="Text 4"/>
+          <p:cNvSpPr/>
+          <p:nvPr/>
+        </p:nvSpPr>
+        <p:spPr>
+          <a:xfrm>
+            <a:off x="793790" y="4062209"/>
             <a:ext cx="13042821" cy="362903"/>
           </a:xfrm>
           <a:prstGeom prst="rect">
@@ -2618,7 +2305,7 @@
                 <a:ea typeface="Montserrat" pitchFamily="34" charset="-122"/>
                 <a:cs typeface="Montserrat" pitchFamily="34" charset="-120"/>
               </a:rPr>
-              <a:t>Entscheidungsmatrix: Warum dieses Projekt?</a:t>
+              <a:t>Live-Demonstration: Das Satzspiel in Aktion</a:t>
             </a:r>
             <a:endParaRPr lang="en-US" sz="1750" dirty="0"/>
           </a:p>
@@ -2626,13 +2313,13 @@
       </p:sp>
       <p:sp>
         <p:nvSpPr>
-          <p:cNvPr id="6" name="Text 4"/>
-          <p:cNvSpPr/>
-          <p:nvPr/>
-        </p:nvSpPr>
-        <p:spPr>
-          <a:xfrm>
-            <a:off x="793790" y="4514493"/>
+          <p:cNvPr id="7" name="Text 5"/>
+          <p:cNvSpPr/>
+          <p:nvPr/>
+        </p:nvSpPr>
+        <p:spPr>
+          <a:xfrm>
+            <a:off x="793790" y="4494574"/>
             <a:ext cx="13042821" cy="362903"/>
           </a:xfrm>
           <a:prstGeom prst="rect">
@@ -2661,7 +2348,7 @@
                 <a:ea typeface="Montserrat" pitchFamily="34" charset="-122"/>
                 <a:cs typeface="Montserrat" pitchFamily="34" charset="-120"/>
               </a:rPr>
-              <a:t>Live-Demonstration: Das Satzspiel in Aktion</a:t>
+              <a:t>Erkenntnisse: Was lief gut, was schlecht</a:t>
             </a:r>
             <a:endParaRPr lang="en-US" sz="1750" dirty="0"/>
           </a:p>
@@ -2669,13 +2356,13 @@
       </p:sp>
       <p:sp>
         <p:nvSpPr>
-          <p:cNvPr id="7" name="Text 5"/>
-          <p:cNvSpPr/>
-          <p:nvPr/>
-        </p:nvSpPr>
-        <p:spPr>
-          <a:xfrm>
-            <a:off x="793790" y="4956691"/>
+          <p:cNvPr id="8" name="Text 6"/>
+          <p:cNvSpPr/>
+          <p:nvPr/>
+        </p:nvSpPr>
+        <p:spPr>
+          <a:xfrm>
+            <a:off x="793790" y="4887609"/>
             <a:ext cx="13042821" cy="362903"/>
           </a:xfrm>
           <a:prstGeom prst="rect">
@@ -2704,7 +2391,7 @@
                 <a:ea typeface="Montserrat" pitchFamily="34" charset="-122"/>
                 <a:cs typeface="Montserrat" pitchFamily="34" charset="-120"/>
               </a:rPr>
-              <a:t>Erkenntnisse: Was lief gut, was schlecht</a:t>
+              <a:t>Fazit: Erfolgreiche Projektabschluss</a:t>
             </a:r>
             <a:endParaRPr lang="en-US" sz="1750" dirty="0"/>
           </a:p>
@@ -2712,56 +2399,13 @@
       </p:sp>
       <p:sp>
         <p:nvSpPr>
-          <p:cNvPr id="8" name="Text 6"/>
-          <p:cNvSpPr/>
-          <p:nvPr/>
-        </p:nvSpPr>
-        <p:spPr>
-          <a:xfrm>
-            <a:off x="793790" y="5398889"/>
-            <a:ext cx="13042821" cy="362903"/>
-          </a:xfrm>
-          <a:prstGeom prst="rect">
-            <a:avLst/>
-          </a:prstGeom>
-          <a:noFill/>
-          <a:ln/>
-        </p:spPr>
-        <p:txBody>
-          <a:bodyPr wrap="none" lIns="0" tIns="0" rIns="0" bIns="0" rtlCol="0" anchor="t"/>
-          <a:lstStyle/>
-          <a:p>
-            <a:pPr marL="342900" indent="-342900" algn="l">
-              <a:lnSpc>
-                <a:spcPts val="2850"/>
-              </a:lnSpc>
-              <a:buSzPct val="100000"/>
-              <a:buChar char="•"/>
-            </a:pPr>
-            <a:r>
-              <a:rPr lang="en-US" sz="1750" dirty="0">
-                <a:solidFill>
-                  <a:srgbClr val="E5DCE6"/>
-                </a:solidFill>
-                <a:latin typeface="Montserrat" pitchFamily="34" charset="0"/>
-                <a:ea typeface="Montserrat" pitchFamily="34" charset="-122"/>
-                <a:cs typeface="Montserrat" pitchFamily="34" charset="-120"/>
-              </a:rPr>
-              <a:t>Fazit: Erfolgreiche Projektabschluss</a:t>
-            </a:r>
-            <a:endParaRPr lang="en-US" sz="1750" dirty="0"/>
-          </a:p>
-        </p:txBody>
-      </p:sp>
-      <p:sp>
-        <p:nvSpPr>
           <p:cNvPr id="9" name="Text 7"/>
           <p:cNvSpPr/>
           <p:nvPr/>
         </p:nvSpPr>
         <p:spPr>
           <a:xfrm>
-            <a:off x="793790" y="5841087"/>
+            <a:off x="793790" y="5260981"/>
             <a:ext cx="13042821" cy="362903"/>
           </a:xfrm>
           <a:prstGeom prst="rect">
@@ -4103,7 +3747,7 @@
                 <a:ea typeface="Bricolage Grotesque Extra Bold" pitchFamily="34" charset="-122"/>
                 <a:cs typeface="Bricolage Grotesque Extra Bold" pitchFamily="34" charset="-120"/>
               </a:rPr>
-              <a:t>Tag 10-13: Abschluss</a:t>
+              <a:t>Tag 10-12: Abschluss</a:t>
             </a:r>
             <a:endParaRPr lang="en-US" sz="1950" dirty="0"/>
           </a:p>
@@ -5358,1134 +5002,6 @@
 
 <file path=ppt/slides/slide5.xml><?xml version="1.0" encoding="utf-8"?>
 <p:sld xmlns:a="http://schemas.openxmlformats.org/drawingml/2006/main" xmlns:r="http://schemas.openxmlformats.org/officeDocument/2006/relationships" xmlns:p="http://schemas.openxmlformats.org/presentationml/2006/main">
-  <p:cSld name="Slide 5">
-    <p:spTree>
-      <p:nvGrpSpPr>
-        <p:cNvPr id="1" name=""/>
-        <p:cNvGrpSpPr/>
-        <p:nvPr/>
-      </p:nvGrpSpPr>
-      <p:grpSpPr>
-        <a:xfrm>
-          <a:off x="0" y="0"/>
-          <a:ext cx="0" cy="0"/>
-          <a:chOff x="0" y="0"/>
-          <a:chExt cx="0" cy="0"/>
-        </a:xfrm>
-      </p:grpSpPr>
-      <p:sp>
-        <p:nvSpPr>
-          <p:cNvPr id="2" name="Text 0"/>
-          <p:cNvSpPr/>
-          <p:nvPr/>
-        </p:nvSpPr>
-        <p:spPr>
-          <a:xfrm>
-            <a:off x="793790" y="1409700"/>
-            <a:ext cx="12743974" cy="708779"/>
-          </a:xfrm>
-          <a:prstGeom prst="rect">
-            <a:avLst/>
-          </a:prstGeom>
-          <a:noFill/>
-          <a:ln/>
-        </p:spPr>
-        <p:txBody>
-          <a:bodyPr wrap="none" lIns="0" tIns="0" rIns="0" bIns="0" rtlCol="0" anchor="t"/>
-          <a:lstStyle/>
-          <a:p>
-            <a:pPr marL="0" indent="0" algn="l">
-              <a:lnSpc>
-                <a:spcPts val="5550"/>
-              </a:lnSpc>
-              <a:buNone/>
-            </a:pPr>
-            <a:r>
-              <a:rPr lang="en-US" sz="4450" b="1" dirty="0">
-                <a:solidFill>
-                  <a:srgbClr val="EEAEF6"/>
-                </a:solidFill>
-                <a:latin typeface="Bricolage Grotesque Extra Bold" pitchFamily="34" charset="0"/>
-                <a:ea typeface="Bricolage Grotesque Extra Bold" pitchFamily="34" charset="-122"/>
-                <a:cs typeface="Bricolage Grotesque Extra Bold" pitchFamily="34" charset="-120"/>
-              </a:rPr>
-              <a:t>Entscheidungsmatrix: Warum dieses Projekt?</a:t>
-            </a:r>
-            <a:endParaRPr lang="en-US" sz="4450" dirty="0"/>
-          </a:p>
-        </p:txBody>
-      </p:sp>
-      <p:sp>
-        <p:nvSpPr>
-          <p:cNvPr id="3" name="Text 1"/>
-          <p:cNvSpPr/>
-          <p:nvPr/>
-        </p:nvSpPr>
-        <p:spPr>
-          <a:xfrm>
-            <a:off x="793790" y="2572107"/>
-            <a:ext cx="13042821" cy="725805"/>
-          </a:xfrm>
-          <a:prstGeom prst="rect">
-            <a:avLst/>
-          </a:prstGeom>
-          <a:noFill/>
-          <a:ln/>
-        </p:spPr>
-        <p:txBody>
-          <a:bodyPr wrap="square" lIns="0" tIns="0" rIns="0" bIns="0" rtlCol="0" anchor="t"/>
-          <a:lstStyle/>
-          <a:p>
-            <a:pPr marL="0" indent="0" algn="l">
-              <a:lnSpc>
-                <a:spcPts val="2850"/>
-              </a:lnSpc>
-              <a:buNone/>
-            </a:pPr>
-            <a:r>
-              <a:rPr lang="en-US" sz="1750" dirty="0">
-                <a:solidFill>
-                  <a:srgbClr val="E5DCE6"/>
-                </a:solidFill>
-                <a:latin typeface="Montserrat" pitchFamily="34" charset="0"/>
-                <a:ea typeface="Montserrat" pitchFamily="34" charset="-122"/>
-                <a:cs typeface="Montserrat" pitchFamily="34" charset="-120"/>
-              </a:rPr>
-              <a:t>Die Wahl des "Satzspiels mit Voting" basierte auf einer detaillierten Analyse verschiedener Projektideen. Diese Matrix zeigt die Schlüsselkriterien und warum unser Konzept überzeugte.</a:t>
-            </a:r>
-            <a:endParaRPr lang="en-US" sz="1750" dirty="0"/>
-          </a:p>
-        </p:txBody>
-      </p:sp>
-      <p:sp>
-        <p:nvSpPr>
-          <p:cNvPr id="4" name="Shape 2"/>
-          <p:cNvSpPr/>
-          <p:nvPr/>
-        </p:nvSpPr>
-        <p:spPr>
-          <a:xfrm>
-            <a:off x="793790" y="3553063"/>
-            <a:ext cx="13042821" cy="3266837"/>
-          </a:xfrm>
-          <a:prstGeom prst="roundRect">
-            <a:avLst>
-              <a:gd name="adj" fmla="val 2916"/>
-            </a:avLst>
-          </a:prstGeom>
-          <a:noFill/>
-          <a:ln w="7620">
-            <a:solidFill>
-              <a:srgbClr val="FFFFFF">
-                <a:alpha val="24000"/>
-              </a:srgbClr>
-            </a:solidFill>
-            <a:prstDash val="solid"/>
-          </a:ln>
-        </p:spPr>
-        <p:txBody>
-          <a:bodyPr/>
-          <a:lstStyle/>
-          <a:p>
-            <a:endParaRPr lang="en-CH"/>
-          </a:p>
-        </p:txBody>
-      </p:sp>
-      <p:sp>
-        <p:nvSpPr>
-          <p:cNvPr id="5" name="Shape 3"/>
-          <p:cNvSpPr/>
-          <p:nvPr/>
-        </p:nvSpPr>
-        <p:spPr>
-          <a:xfrm>
-            <a:off x="801410" y="3560683"/>
-            <a:ext cx="13027581" cy="650319"/>
-          </a:xfrm>
-          <a:prstGeom prst="rect">
-            <a:avLst/>
-          </a:prstGeom>
-          <a:solidFill>
-            <a:srgbClr val="FFFFFF">
-              <a:alpha val="4000"/>
-            </a:srgbClr>
-          </a:solidFill>
-          <a:ln/>
-        </p:spPr>
-        <p:txBody>
-          <a:bodyPr/>
-          <a:lstStyle/>
-          <a:p>
-            <a:endParaRPr lang="en-CH"/>
-          </a:p>
-        </p:txBody>
-      </p:sp>
-      <p:sp>
-        <p:nvSpPr>
-          <p:cNvPr id="6" name="Text 4"/>
-          <p:cNvSpPr/>
-          <p:nvPr/>
-        </p:nvSpPr>
-        <p:spPr>
-          <a:xfrm>
-            <a:off x="1028462" y="3704392"/>
-            <a:ext cx="2799397" cy="362903"/>
-          </a:xfrm>
-          <a:prstGeom prst="rect">
-            <a:avLst/>
-          </a:prstGeom>
-          <a:noFill/>
-          <a:ln/>
-        </p:spPr>
-        <p:txBody>
-          <a:bodyPr wrap="none" lIns="0" tIns="0" rIns="0" bIns="0" rtlCol="0" anchor="t"/>
-          <a:lstStyle/>
-          <a:p>
-            <a:pPr marL="0" indent="0" algn="l">
-              <a:lnSpc>
-                <a:spcPts val="2850"/>
-              </a:lnSpc>
-              <a:buNone/>
-            </a:pPr>
-            <a:r>
-              <a:rPr lang="en-US" sz="1750" dirty="0">
-                <a:solidFill>
-                  <a:srgbClr val="E5DCE6"/>
-                </a:solidFill>
-                <a:latin typeface="Montserrat" pitchFamily="34" charset="0"/>
-                <a:ea typeface="Montserrat" pitchFamily="34" charset="-122"/>
-                <a:cs typeface="Montserrat" pitchFamily="34" charset="-120"/>
-              </a:rPr>
-              <a:t>Kriterium</a:t>
-            </a:r>
-            <a:endParaRPr lang="en-US" sz="1750" dirty="0"/>
-          </a:p>
-        </p:txBody>
-      </p:sp>
-      <p:sp>
-        <p:nvSpPr>
-          <p:cNvPr id="7" name="Text 5"/>
-          <p:cNvSpPr/>
-          <p:nvPr/>
-        </p:nvSpPr>
-        <p:spPr>
-          <a:xfrm>
-            <a:off x="4289108" y="3704392"/>
-            <a:ext cx="2795588" cy="362903"/>
-          </a:xfrm>
-          <a:prstGeom prst="rect">
-            <a:avLst/>
-          </a:prstGeom>
-          <a:noFill/>
-          <a:ln/>
-        </p:spPr>
-        <p:txBody>
-          <a:bodyPr wrap="none" lIns="0" tIns="0" rIns="0" bIns="0" rtlCol="0" anchor="t"/>
-          <a:lstStyle/>
-          <a:p>
-            <a:pPr marL="0" indent="0" algn="l">
-              <a:lnSpc>
-                <a:spcPts val="2850"/>
-              </a:lnSpc>
-              <a:buNone/>
-            </a:pPr>
-            <a:r>
-              <a:rPr lang="en-US" sz="1750" dirty="0">
-                <a:solidFill>
-                  <a:srgbClr val="E5DCE6"/>
-                </a:solidFill>
-                <a:latin typeface="Montserrat" pitchFamily="34" charset="0"/>
-                <a:ea typeface="Montserrat" pitchFamily="34" charset="-122"/>
-                <a:cs typeface="Montserrat" pitchFamily="34" charset="-120"/>
-              </a:rPr>
-              <a:t>Satzspiel mit Voting</a:t>
-            </a:r>
-            <a:endParaRPr lang="en-US" sz="1750" dirty="0"/>
-          </a:p>
-        </p:txBody>
-      </p:sp>
-      <p:sp>
-        <p:nvSpPr>
-          <p:cNvPr id="8" name="Text 6"/>
-          <p:cNvSpPr/>
-          <p:nvPr/>
-        </p:nvSpPr>
-        <p:spPr>
-          <a:xfrm>
-            <a:off x="7545943" y="3704392"/>
-            <a:ext cx="2795588" cy="362903"/>
-          </a:xfrm>
-          <a:prstGeom prst="rect">
-            <a:avLst/>
-          </a:prstGeom>
-          <a:noFill/>
-          <a:ln/>
-        </p:spPr>
-        <p:txBody>
-          <a:bodyPr wrap="none" lIns="0" tIns="0" rIns="0" bIns="0" rtlCol="0" anchor="t"/>
-          <a:lstStyle/>
-          <a:p>
-            <a:pPr marL="0" indent="0" algn="l">
-              <a:lnSpc>
-                <a:spcPts val="2850"/>
-              </a:lnSpc>
-              <a:buNone/>
-            </a:pPr>
-            <a:r>
-              <a:rPr lang="en-US" sz="1750" dirty="0">
-                <a:solidFill>
-                  <a:srgbClr val="E5DCE6"/>
-                </a:solidFill>
-                <a:latin typeface="Montserrat" pitchFamily="34" charset="0"/>
-                <a:ea typeface="Montserrat" pitchFamily="34" charset="-122"/>
-                <a:cs typeface="Montserrat" pitchFamily="34" charset="-120"/>
-              </a:rPr>
-              <a:t>Idee B Tattoo Generator</a:t>
-            </a:r>
-            <a:endParaRPr lang="en-US" sz="1750" dirty="0"/>
-          </a:p>
-        </p:txBody>
-      </p:sp>
-      <p:sp>
-        <p:nvSpPr>
-          <p:cNvPr id="9" name="Text 7"/>
-          <p:cNvSpPr/>
-          <p:nvPr/>
-        </p:nvSpPr>
-        <p:spPr>
-          <a:xfrm>
-            <a:off x="10802779" y="3704392"/>
-            <a:ext cx="2799397" cy="362903"/>
-          </a:xfrm>
-          <a:prstGeom prst="rect">
-            <a:avLst/>
-          </a:prstGeom>
-          <a:noFill/>
-          <a:ln/>
-        </p:spPr>
-        <p:txBody>
-          <a:bodyPr wrap="none" lIns="0" tIns="0" rIns="0" bIns="0" rtlCol="0" anchor="t"/>
-          <a:lstStyle/>
-          <a:p>
-            <a:pPr marL="0" indent="0" algn="l">
-              <a:lnSpc>
-                <a:spcPts val="2850"/>
-              </a:lnSpc>
-              <a:buNone/>
-            </a:pPr>
-            <a:r>
-              <a:rPr lang="en-US" sz="1750" dirty="0">
-                <a:solidFill>
-                  <a:srgbClr val="E5DCE6"/>
-                </a:solidFill>
-                <a:latin typeface="Montserrat" pitchFamily="34" charset="0"/>
-                <a:ea typeface="Montserrat" pitchFamily="34" charset="-122"/>
-                <a:cs typeface="Montserrat" pitchFamily="34" charset="-120"/>
-              </a:rPr>
-              <a:t>Idee C Quiz-Spiel </a:t>
-            </a:r>
-            <a:endParaRPr lang="en-US" sz="1750" dirty="0"/>
-          </a:p>
-        </p:txBody>
-      </p:sp>
-      <p:sp>
-        <p:nvSpPr>
-          <p:cNvPr id="10" name="Shape 8"/>
-          <p:cNvSpPr/>
-          <p:nvPr/>
-        </p:nvSpPr>
-        <p:spPr>
-          <a:xfrm>
-            <a:off x="801410" y="4211003"/>
-            <a:ext cx="13027581" cy="650319"/>
-          </a:xfrm>
-          <a:prstGeom prst="rect">
-            <a:avLst/>
-          </a:prstGeom>
-          <a:solidFill>
-            <a:srgbClr val="000000">
-              <a:alpha val="4000"/>
-            </a:srgbClr>
-          </a:solidFill>
-          <a:ln/>
-        </p:spPr>
-        <p:txBody>
-          <a:bodyPr/>
-          <a:lstStyle/>
-          <a:p>
-            <a:endParaRPr lang="en-CH"/>
-          </a:p>
-        </p:txBody>
-      </p:sp>
-      <p:sp>
-        <p:nvSpPr>
-          <p:cNvPr id="11" name="Text 9"/>
-          <p:cNvSpPr/>
-          <p:nvPr/>
-        </p:nvSpPr>
-        <p:spPr>
-          <a:xfrm>
-            <a:off x="1028462" y="4354711"/>
-            <a:ext cx="2799397" cy="362903"/>
-          </a:xfrm>
-          <a:prstGeom prst="rect">
-            <a:avLst/>
-          </a:prstGeom>
-          <a:noFill/>
-          <a:ln/>
-        </p:spPr>
-        <p:txBody>
-          <a:bodyPr wrap="none" lIns="0" tIns="0" rIns="0" bIns="0" rtlCol="0" anchor="t"/>
-          <a:lstStyle/>
-          <a:p>
-            <a:pPr marL="0" indent="0" algn="l">
-              <a:lnSpc>
-                <a:spcPts val="2850"/>
-              </a:lnSpc>
-              <a:buNone/>
-            </a:pPr>
-            <a:r>
-              <a:rPr lang="en-US" sz="1750" dirty="0">
-                <a:solidFill>
-                  <a:srgbClr val="E5DCE6"/>
-                </a:solidFill>
-                <a:latin typeface="Montserrat" pitchFamily="34" charset="0"/>
-                <a:ea typeface="Montserrat" pitchFamily="34" charset="-122"/>
-                <a:cs typeface="Montserrat" pitchFamily="34" charset="-120"/>
-              </a:rPr>
-              <a:t>Komplexität</a:t>
-            </a:r>
-            <a:endParaRPr lang="en-US" sz="1750" dirty="0"/>
-          </a:p>
-        </p:txBody>
-      </p:sp>
-      <p:sp>
-        <p:nvSpPr>
-          <p:cNvPr id="12" name="Text 10"/>
-          <p:cNvSpPr/>
-          <p:nvPr/>
-        </p:nvSpPr>
-        <p:spPr>
-          <a:xfrm>
-            <a:off x="4289108" y="4354711"/>
-            <a:ext cx="2795588" cy="362903"/>
-          </a:xfrm>
-          <a:prstGeom prst="rect">
-            <a:avLst/>
-          </a:prstGeom>
-          <a:noFill/>
-          <a:ln/>
-        </p:spPr>
-        <p:txBody>
-          <a:bodyPr wrap="none" lIns="0" tIns="0" rIns="0" bIns="0" rtlCol="0" anchor="t"/>
-          <a:lstStyle/>
-          <a:p>
-            <a:pPr marL="0" indent="0" algn="l">
-              <a:lnSpc>
-                <a:spcPts val="2850"/>
-              </a:lnSpc>
-              <a:buNone/>
-            </a:pPr>
-            <a:r>
-              <a:rPr lang="en-US" sz="1750" dirty="0">
-                <a:solidFill>
-                  <a:srgbClr val="E5DCE6"/>
-                </a:solidFill>
-                <a:latin typeface="Montserrat" pitchFamily="34" charset="0"/>
-                <a:ea typeface="Montserrat" pitchFamily="34" charset="-122"/>
-                <a:cs typeface="Montserrat" pitchFamily="34" charset="-120"/>
-              </a:rPr>
-              <a:t>Mittel</a:t>
-            </a:r>
-            <a:endParaRPr lang="en-US" sz="1750" dirty="0"/>
-          </a:p>
-        </p:txBody>
-      </p:sp>
-      <p:sp>
-        <p:nvSpPr>
-          <p:cNvPr id="13" name="Text 11"/>
-          <p:cNvSpPr/>
-          <p:nvPr/>
-        </p:nvSpPr>
-        <p:spPr>
-          <a:xfrm>
-            <a:off x="7545943" y="4354711"/>
-            <a:ext cx="2795588" cy="362903"/>
-          </a:xfrm>
-          <a:prstGeom prst="rect">
-            <a:avLst/>
-          </a:prstGeom>
-          <a:noFill/>
-          <a:ln/>
-        </p:spPr>
-        <p:txBody>
-          <a:bodyPr wrap="none" lIns="0" tIns="0" rIns="0" bIns="0" rtlCol="0" anchor="t"/>
-          <a:lstStyle/>
-          <a:p>
-            <a:pPr marL="0" indent="0" algn="l">
-              <a:lnSpc>
-                <a:spcPts val="2850"/>
-              </a:lnSpc>
-              <a:buNone/>
-            </a:pPr>
-            <a:r>
-              <a:rPr lang="en-US" sz="1750" dirty="0">
-                <a:solidFill>
-                  <a:srgbClr val="E5DCE6"/>
-                </a:solidFill>
-                <a:latin typeface="Montserrat" pitchFamily="34" charset="0"/>
-                <a:ea typeface="Montserrat" pitchFamily="34" charset="-122"/>
-                <a:cs typeface="Montserrat" pitchFamily="34" charset="-120"/>
-              </a:rPr>
-              <a:t>Hoch</a:t>
-            </a:r>
-            <a:endParaRPr lang="en-US" sz="1750" dirty="0"/>
-          </a:p>
-        </p:txBody>
-      </p:sp>
-      <p:sp>
-        <p:nvSpPr>
-          <p:cNvPr id="14" name="Text 12"/>
-          <p:cNvSpPr/>
-          <p:nvPr/>
-        </p:nvSpPr>
-        <p:spPr>
-          <a:xfrm>
-            <a:off x="10802779" y="4354711"/>
-            <a:ext cx="2799397" cy="362903"/>
-          </a:xfrm>
-          <a:prstGeom prst="rect">
-            <a:avLst/>
-          </a:prstGeom>
-          <a:noFill/>
-          <a:ln/>
-        </p:spPr>
-        <p:txBody>
-          <a:bodyPr wrap="none" lIns="0" tIns="0" rIns="0" bIns="0" rtlCol="0" anchor="t"/>
-          <a:lstStyle/>
-          <a:p>
-            <a:pPr marL="0" indent="0" algn="l">
-              <a:lnSpc>
-                <a:spcPts val="2850"/>
-              </a:lnSpc>
-              <a:buNone/>
-            </a:pPr>
-            <a:r>
-              <a:rPr lang="en-US" sz="1750" dirty="0">
-                <a:solidFill>
-                  <a:srgbClr val="E5DCE6"/>
-                </a:solidFill>
-                <a:latin typeface="Montserrat" pitchFamily="34" charset="0"/>
-                <a:ea typeface="Montserrat" pitchFamily="34" charset="-122"/>
-                <a:cs typeface="Montserrat" pitchFamily="34" charset="-120"/>
-              </a:rPr>
-              <a:t>Niedrig</a:t>
-            </a:r>
-            <a:endParaRPr lang="en-US" sz="1750" dirty="0"/>
-          </a:p>
-        </p:txBody>
-      </p:sp>
-      <p:sp>
-        <p:nvSpPr>
-          <p:cNvPr id="15" name="Shape 13"/>
-          <p:cNvSpPr/>
-          <p:nvPr/>
-        </p:nvSpPr>
-        <p:spPr>
-          <a:xfrm>
-            <a:off x="801410" y="4861322"/>
-            <a:ext cx="13027581" cy="650319"/>
-          </a:xfrm>
-          <a:prstGeom prst="rect">
-            <a:avLst/>
-          </a:prstGeom>
-          <a:solidFill>
-            <a:srgbClr val="FFFFFF">
-              <a:alpha val="4000"/>
-            </a:srgbClr>
-          </a:solidFill>
-          <a:ln/>
-        </p:spPr>
-        <p:txBody>
-          <a:bodyPr/>
-          <a:lstStyle/>
-          <a:p>
-            <a:endParaRPr lang="en-CH"/>
-          </a:p>
-        </p:txBody>
-      </p:sp>
-      <p:sp>
-        <p:nvSpPr>
-          <p:cNvPr id="16" name="Text 14"/>
-          <p:cNvSpPr/>
-          <p:nvPr/>
-        </p:nvSpPr>
-        <p:spPr>
-          <a:xfrm>
-            <a:off x="1028462" y="5005030"/>
-            <a:ext cx="2799397" cy="362903"/>
-          </a:xfrm>
-          <a:prstGeom prst="rect">
-            <a:avLst/>
-          </a:prstGeom>
-          <a:noFill/>
-          <a:ln/>
-        </p:spPr>
-        <p:txBody>
-          <a:bodyPr wrap="none" lIns="0" tIns="0" rIns="0" bIns="0" rtlCol="0" anchor="t"/>
-          <a:lstStyle/>
-          <a:p>
-            <a:pPr marL="0" indent="0" algn="l">
-              <a:lnSpc>
-                <a:spcPts val="2850"/>
-              </a:lnSpc>
-              <a:buNone/>
-            </a:pPr>
-            <a:r>
-              <a:rPr lang="en-US" sz="1750" dirty="0">
-                <a:solidFill>
-                  <a:srgbClr val="E5DCE6"/>
-                </a:solidFill>
-                <a:latin typeface="Montserrat" pitchFamily="34" charset="0"/>
-                <a:ea typeface="Montserrat" pitchFamily="34" charset="-122"/>
-                <a:cs typeface="Montserrat" pitchFamily="34" charset="-120"/>
-              </a:rPr>
-              <a:t>Lernpotenzial</a:t>
-            </a:r>
-            <a:endParaRPr lang="en-US" sz="1750" dirty="0"/>
-          </a:p>
-        </p:txBody>
-      </p:sp>
-      <p:sp>
-        <p:nvSpPr>
-          <p:cNvPr id="17" name="Text 15"/>
-          <p:cNvSpPr/>
-          <p:nvPr/>
-        </p:nvSpPr>
-        <p:spPr>
-          <a:xfrm>
-            <a:off x="4289108" y="5005030"/>
-            <a:ext cx="2795588" cy="362903"/>
-          </a:xfrm>
-          <a:prstGeom prst="rect">
-            <a:avLst/>
-          </a:prstGeom>
-          <a:noFill/>
-          <a:ln/>
-        </p:spPr>
-        <p:txBody>
-          <a:bodyPr wrap="none" lIns="0" tIns="0" rIns="0" bIns="0" rtlCol="0" anchor="t"/>
-          <a:lstStyle/>
-          <a:p>
-            <a:pPr marL="0" indent="0" algn="l">
-              <a:lnSpc>
-                <a:spcPts val="2850"/>
-              </a:lnSpc>
-              <a:buNone/>
-            </a:pPr>
-            <a:r>
-              <a:rPr lang="en-US" sz="1750" dirty="0">
-                <a:solidFill>
-                  <a:srgbClr val="E5DCE6"/>
-                </a:solidFill>
-                <a:latin typeface="Montserrat" pitchFamily="34" charset="0"/>
-                <a:ea typeface="Montserrat" pitchFamily="34" charset="-122"/>
-                <a:cs typeface="Montserrat" pitchFamily="34" charset="-120"/>
-              </a:rPr>
-              <a:t>Hoch</a:t>
-            </a:r>
-            <a:endParaRPr lang="en-US" sz="1750" dirty="0"/>
-          </a:p>
-        </p:txBody>
-      </p:sp>
-      <p:sp>
-        <p:nvSpPr>
-          <p:cNvPr id="18" name="Text 16"/>
-          <p:cNvSpPr/>
-          <p:nvPr/>
-        </p:nvSpPr>
-        <p:spPr>
-          <a:xfrm>
-            <a:off x="7545943" y="5005030"/>
-            <a:ext cx="2795588" cy="362903"/>
-          </a:xfrm>
-          <a:prstGeom prst="rect">
-            <a:avLst/>
-          </a:prstGeom>
-          <a:noFill/>
-          <a:ln/>
-        </p:spPr>
-        <p:txBody>
-          <a:bodyPr wrap="none" lIns="0" tIns="0" rIns="0" bIns="0" rtlCol="0" anchor="t"/>
-          <a:lstStyle/>
-          <a:p>
-            <a:pPr marL="0" indent="0" algn="l">
-              <a:lnSpc>
-                <a:spcPts val="2850"/>
-              </a:lnSpc>
-              <a:buNone/>
-            </a:pPr>
-            <a:r>
-              <a:rPr lang="en-US" sz="1750" dirty="0">
-                <a:solidFill>
-                  <a:srgbClr val="E5DCE6"/>
-                </a:solidFill>
-                <a:latin typeface="Montserrat" pitchFamily="34" charset="0"/>
-                <a:ea typeface="Montserrat" pitchFamily="34" charset="-122"/>
-                <a:cs typeface="Montserrat" pitchFamily="34" charset="-120"/>
-              </a:rPr>
-              <a:t>Mittel</a:t>
-            </a:r>
-            <a:endParaRPr lang="en-US" sz="1750" dirty="0"/>
-          </a:p>
-        </p:txBody>
-      </p:sp>
-      <p:sp>
-        <p:nvSpPr>
-          <p:cNvPr id="19" name="Text 17"/>
-          <p:cNvSpPr/>
-          <p:nvPr/>
-        </p:nvSpPr>
-        <p:spPr>
-          <a:xfrm>
-            <a:off x="10802779" y="5005030"/>
-            <a:ext cx="2799397" cy="362903"/>
-          </a:xfrm>
-          <a:prstGeom prst="rect">
-            <a:avLst/>
-          </a:prstGeom>
-          <a:noFill/>
-          <a:ln/>
-        </p:spPr>
-        <p:txBody>
-          <a:bodyPr wrap="none" lIns="0" tIns="0" rIns="0" bIns="0" rtlCol="0" anchor="t"/>
-          <a:lstStyle/>
-          <a:p>
-            <a:pPr marL="0" indent="0" algn="l">
-              <a:lnSpc>
-                <a:spcPts val="2850"/>
-              </a:lnSpc>
-              <a:buNone/>
-            </a:pPr>
-            <a:r>
-              <a:rPr lang="en-US" sz="1750" dirty="0">
-                <a:solidFill>
-                  <a:srgbClr val="E5DCE6"/>
-                </a:solidFill>
-                <a:latin typeface="Montserrat" pitchFamily="34" charset="0"/>
-                <a:ea typeface="Montserrat" pitchFamily="34" charset="-122"/>
-                <a:cs typeface="Montserrat" pitchFamily="34" charset="-120"/>
-              </a:rPr>
-              <a:t>Niedrig</a:t>
-            </a:r>
-            <a:endParaRPr lang="en-US" sz="1750" dirty="0"/>
-          </a:p>
-        </p:txBody>
-      </p:sp>
-      <p:sp>
-        <p:nvSpPr>
-          <p:cNvPr id="20" name="Shape 18"/>
-          <p:cNvSpPr/>
-          <p:nvPr/>
-        </p:nvSpPr>
-        <p:spPr>
-          <a:xfrm>
-            <a:off x="801410" y="5511641"/>
-            <a:ext cx="13027581" cy="650319"/>
-          </a:xfrm>
-          <a:prstGeom prst="rect">
-            <a:avLst/>
-          </a:prstGeom>
-          <a:solidFill>
-            <a:srgbClr val="000000">
-              <a:alpha val="4000"/>
-            </a:srgbClr>
-          </a:solidFill>
-          <a:ln/>
-        </p:spPr>
-        <p:txBody>
-          <a:bodyPr/>
-          <a:lstStyle/>
-          <a:p>
-            <a:endParaRPr lang="en-CH"/>
-          </a:p>
-        </p:txBody>
-      </p:sp>
-      <p:sp>
-        <p:nvSpPr>
-          <p:cNvPr id="21" name="Text 19"/>
-          <p:cNvSpPr/>
-          <p:nvPr/>
-        </p:nvSpPr>
-        <p:spPr>
-          <a:xfrm>
-            <a:off x="1028462" y="5655350"/>
-            <a:ext cx="2799397" cy="362903"/>
-          </a:xfrm>
-          <a:prstGeom prst="rect">
-            <a:avLst/>
-          </a:prstGeom>
-          <a:noFill/>
-          <a:ln/>
-        </p:spPr>
-        <p:txBody>
-          <a:bodyPr wrap="none" lIns="0" tIns="0" rIns="0" bIns="0" rtlCol="0" anchor="t"/>
-          <a:lstStyle/>
-          <a:p>
-            <a:pPr marL="0" indent="0" algn="l">
-              <a:lnSpc>
-                <a:spcPts val="2850"/>
-              </a:lnSpc>
-              <a:buNone/>
-            </a:pPr>
-            <a:r>
-              <a:rPr lang="en-US" sz="1750" dirty="0">
-                <a:solidFill>
-                  <a:srgbClr val="E5DCE6"/>
-                </a:solidFill>
-                <a:latin typeface="Montserrat" pitchFamily="34" charset="0"/>
-                <a:ea typeface="Montserrat" pitchFamily="34" charset="-122"/>
-                <a:cs typeface="Montserrat" pitchFamily="34" charset="-120"/>
-              </a:rPr>
-              <a:t>Innovationsgrad</a:t>
-            </a:r>
-            <a:endParaRPr lang="en-US" sz="1750" dirty="0"/>
-          </a:p>
-        </p:txBody>
-      </p:sp>
-      <p:sp>
-        <p:nvSpPr>
-          <p:cNvPr id="22" name="Text 20"/>
-          <p:cNvSpPr/>
-          <p:nvPr/>
-        </p:nvSpPr>
-        <p:spPr>
-          <a:xfrm>
-            <a:off x="4289108" y="5655350"/>
-            <a:ext cx="2795588" cy="362903"/>
-          </a:xfrm>
-          <a:prstGeom prst="rect">
-            <a:avLst/>
-          </a:prstGeom>
-          <a:noFill/>
-          <a:ln/>
-        </p:spPr>
-        <p:txBody>
-          <a:bodyPr wrap="none" lIns="0" tIns="0" rIns="0" bIns="0" rtlCol="0" anchor="t"/>
-          <a:lstStyle/>
-          <a:p>
-            <a:pPr marL="0" indent="0" algn="l">
-              <a:lnSpc>
-                <a:spcPts val="2850"/>
-              </a:lnSpc>
-              <a:buNone/>
-            </a:pPr>
-            <a:r>
-              <a:rPr lang="en-US" sz="1750" dirty="0">
-                <a:solidFill>
-                  <a:srgbClr val="E5DCE6"/>
-                </a:solidFill>
-                <a:latin typeface="Montserrat" pitchFamily="34" charset="0"/>
-                <a:ea typeface="Montserrat" pitchFamily="34" charset="-122"/>
-                <a:cs typeface="Montserrat" pitchFamily="34" charset="-120"/>
-              </a:rPr>
-              <a:t>Hoch</a:t>
-            </a:r>
-            <a:endParaRPr lang="en-US" sz="1750" dirty="0"/>
-          </a:p>
-        </p:txBody>
-      </p:sp>
-      <p:sp>
-        <p:nvSpPr>
-          <p:cNvPr id="23" name="Text 21"/>
-          <p:cNvSpPr/>
-          <p:nvPr/>
-        </p:nvSpPr>
-        <p:spPr>
-          <a:xfrm>
-            <a:off x="7545943" y="5655350"/>
-            <a:ext cx="2795588" cy="362903"/>
-          </a:xfrm>
-          <a:prstGeom prst="rect">
-            <a:avLst/>
-          </a:prstGeom>
-          <a:noFill/>
-          <a:ln/>
-        </p:spPr>
-        <p:txBody>
-          <a:bodyPr wrap="none" lIns="0" tIns="0" rIns="0" bIns="0" rtlCol="0" anchor="t"/>
-          <a:lstStyle/>
-          <a:p>
-            <a:pPr marL="0" indent="0" algn="l">
-              <a:lnSpc>
-                <a:spcPts val="2850"/>
-              </a:lnSpc>
-              <a:buNone/>
-            </a:pPr>
-            <a:r>
-              <a:rPr lang="en-US" sz="1750" dirty="0">
-                <a:solidFill>
-                  <a:srgbClr val="E5DCE6"/>
-                </a:solidFill>
-                <a:latin typeface="Montserrat" pitchFamily="34" charset="0"/>
-                <a:ea typeface="Montserrat" pitchFamily="34" charset="-122"/>
-                <a:cs typeface="Montserrat" pitchFamily="34" charset="-120"/>
-              </a:rPr>
-              <a:t>Mittel</a:t>
-            </a:r>
-            <a:endParaRPr lang="en-US" sz="1750" dirty="0"/>
-          </a:p>
-        </p:txBody>
-      </p:sp>
-      <p:sp>
-        <p:nvSpPr>
-          <p:cNvPr id="24" name="Text 22"/>
-          <p:cNvSpPr/>
-          <p:nvPr/>
-        </p:nvSpPr>
-        <p:spPr>
-          <a:xfrm>
-            <a:off x="10802779" y="5655350"/>
-            <a:ext cx="2799397" cy="362903"/>
-          </a:xfrm>
-          <a:prstGeom prst="rect">
-            <a:avLst/>
-          </a:prstGeom>
-          <a:noFill/>
-          <a:ln/>
-        </p:spPr>
-        <p:txBody>
-          <a:bodyPr wrap="none" lIns="0" tIns="0" rIns="0" bIns="0" rtlCol="0" anchor="t"/>
-          <a:lstStyle/>
-          <a:p>
-            <a:pPr marL="0" indent="0" algn="l">
-              <a:lnSpc>
-                <a:spcPts val="2850"/>
-              </a:lnSpc>
-              <a:buNone/>
-            </a:pPr>
-            <a:r>
-              <a:rPr lang="en-US" sz="1750" dirty="0">
-                <a:solidFill>
-                  <a:srgbClr val="E5DCE6"/>
-                </a:solidFill>
-                <a:latin typeface="Montserrat" pitchFamily="34" charset="0"/>
-                <a:ea typeface="Montserrat" pitchFamily="34" charset="-122"/>
-                <a:cs typeface="Montserrat" pitchFamily="34" charset="-120"/>
-              </a:rPr>
-              <a:t>Niedrig</a:t>
-            </a:r>
-            <a:endParaRPr lang="en-US" sz="1750" dirty="0"/>
-          </a:p>
-        </p:txBody>
-      </p:sp>
-      <p:sp>
-        <p:nvSpPr>
-          <p:cNvPr id="25" name="Shape 23"/>
-          <p:cNvSpPr/>
-          <p:nvPr/>
-        </p:nvSpPr>
-        <p:spPr>
-          <a:xfrm>
-            <a:off x="801410" y="6161961"/>
-            <a:ext cx="13027581" cy="650319"/>
-          </a:xfrm>
-          <a:prstGeom prst="rect">
-            <a:avLst/>
-          </a:prstGeom>
-          <a:solidFill>
-            <a:srgbClr val="FFFFFF">
-              <a:alpha val="4000"/>
-            </a:srgbClr>
-          </a:solidFill>
-          <a:ln/>
-        </p:spPr>
-        <p:txBody>
-          <a:bodyPr/>
-          <a:lstStyle/>
-          <a:p>
-            <a:endParaRPr lang="en-CH"/>
-          </a:p>
-        </p:txBody>
-      </p:sp>
-      <p:sp>
-        <p:nvSpPr>
-          <p:cNvPr id="26" name="Text 24"/>
-          <p:cNvSpPr/>
-          <p:nvPr/>
-        </p:nvSpPr>
-        <p:spPr>
-          <a:xfrm>
-            <a:off x="1028462" y="6305669"/>
-            <a:ext cx="2799397" cy="362903"/>
-          </a:xfrm>
-          <a:prstGeom prst="rect">
-            <a:avLst/>
-          </a:prstGeom>
-          <a:noFill/>
-          <a:ln/>
-        </p:spPr>
-        <p:txBody>
-          <a:bodyPr wrap="none" lIns="0" tIns="0" rIns="0" bIns="0" rtlCol="0" anchor="t"/>
-          <a:lstStyle/>
-          <a:p>
-            <a:pPr marL="0" indent="0" algn="l">
-              <a:lnSpc>
-                <a:spcPts val="2850"/>
-              </a:lnSpc>
-              <a:buNone/>
-            </a:pPr>
-            <a:r>
-              <a:rPr lang="en-US" sz="1750" dirty="0">
-                <a:solidFill>
-                  <a:srgbClr val="E5DCE6"/>
-                </a:solidFill>
-                <a:latin typeface="Montserrat" pitchFamily="34" charset="0"/>
-                <a:ea typeface="Montserrat" pitchFamily="34" charset="-122"/>
-                <a:cs typeface="Montserrat" pitchFamily="34" charset="-120"/>
-              </a:rPr>
-              <a:t>Praxisbezug</a:t>
-            </a:r>
-            <a:endParaRPr lang="en-US" sz="1750" dirty="0"/>
-          </a:p>
-        </p:txBody>
-      </p:sp>
-      <p:sp>
-        <p:nvSpPr>
-          <p:cNvPr id="27" name="Text 25"/>
-          <p:cNvSpPr/>
-          <p:nvPr/>
-        </p:nvSpPr>
-        <p:spPr>
-          <a:xfrm>
-            <a:off x="4289108" y="6305669"/>
-            <a:ext cx="2795588" cy="362903"/>
-          </a:xfrm>
-          <a:prstGeom prst="rect">
-            <a:avLst/>
-          </a:prstGeom>
-          <a:noFill/>
-          <a:ln/>
-        </p:spPr>
-        <p:txBody>
-          <a:bodyPr wrap="none" lIns="0" tIns="0" rIns="0" bIns="0" rtlCol="0" anchor="t"/>
-          <a:lstStyle/>
-          <a:p>
-            <a:pPr marL="0" indent="0" algn="l">
-              <a:lnSpc>
-                <a:spcPts val="2850"/>
-              </a:lnSpc>
-              <a:buNone/>
-            </a:pPr>
-            <a:r>
-              <a:rPr lang="en-US" sz="1750" dirty="0">
-                <a:solidFill>
-                  <a:srgbClr val="E5DCE6"/>
-                </a:solidFill>
-                <a:latin typeface="Montserrat" pitchFamily="34" charset="0"/>
-                <a:ea typeface="Montserrat" pitchFamily="34" charset="-122"/>
-                <a:cs typeface="Montserrat" pitchFamily="34" charset="-120"/>
-              </a:rPr>
-              <a:t>Hoch</a:t>
-            </a:r>
-            <a:endParaRPr lang="en-US" sz="1750" dirty="0"/>
-          </a:p>
-        </p:txBody>
-      </p:sp>
-      <p:sp>
-        <p:nvSpPr>
-          <p:cNvPr id="28" name="Text 26"/>
-          <p:cNvSpPr/>
-          <p:nvPr/>
-        </p:nvSpPr>
-        <p:spPr>
-          <a:xfrm>
-            <a:off x="7545943" y="6305669"/>
-            <a:ext cx="2795588" cy="362903"/>
-          </a:xfrm>
-          <a:prstGeom prst="rect">
-            <a:avLst/>
-          </a:prstGeom>
-          <a:noFill/>
-          <a:ln/>
-        </p:spPr>
-        <p:txBody>
-          <a:bodyPr wrap="none" lIns="0" tIns="0" rIns="0" bIns="0" rtlCol="0" anchor="t"/>
-          <a:lstStyle/>
-          <a:p>
-            <a:pPr marL="0" indent="0" algn="l">
-              <a:lnSpc>
-                <a:spcPts val="2850"/>
-              </a:lnSpc>
-              <a:buNone/>
-            </a:pPr>
-            <a:r>
-              <a:rPr lang="en-US" sz="1750" dirty="0">
-                <a:solidFill>
-                  <a:srgbClr val="E5DCE6"/>
-                </a:solidFill>
-                <a:latin typeface="Montserrat" pitchFamily="34" charset="0"/>
-                <a:ea typeface="Montserrat" pitchFamily="34" charset="-122"/>
-                <a:cs typeface="Montserrat" pitchFamily="34" charset="-120"/>
-              </a:rPr>
-              <a:t>Mittel</a:t>
-            </a:r>
-            <a:endParaRPr lang="en-US" sz="1750" dirty="0"/>
-          </a:p>
-        </p:txBody>
-      </p:sp>
-      <p:sp>
-        <p:nvSpPr>
-          <p:cNvPr id="29" name="Text 27"/>
-          <p:cNvSpPr/>
-          <p:nvPr/>
-        </p:nvSpPr>
-        <p:spPr>
-          <a:xfrm>
-            <a:off x="10802779" y="6305669"/>
-            <a:ext cx="2799397" cy="362903"/>
-          </a:xfrm>
-          <a:prstGeom prst="rect">
-            <a:avLst/>
-          </a:prstGeom>
-          <a:noFill/>
-          <a:ln/>
-        </p:spPr>
-        <p:txBody>
-          <a:bodyPr wrap="none" lIns="0" tIns="0" rIns="0" bIns="0" rtlCol="0" anchor="t"/>
-          <a:lstStyle/>
-          <a:p>
-            <a:pPr marL="0" indent="0" algn="l">
-              <a:lnSpc>
-                <a:spcPts val="2850"/>
-              </a:lnSpc>
-              <a:buNone/>
-            </a:pPr>
-            <a:r>
-              <a:rPr lang="en-US" sz="1750" dirty="0">
-                <a:solidFill>
-                  <a:srgbClr val="E5DCE6"/>
-                </a:solidFill>
-                <a:latin typeface="Montserrat" pitchFamily="34" charset="0"/>
-                <a:ea typeface="Montserrat" pitchFamily="34" charset="-122"/>
-                <a:cs typeface="Montserrat" pitchFamily="34" charset="-120"/>
-              </a:rPr>
-              <a:t>Hoch</a:t>
-            </a:r>
-            <a:endParaRPr lang="en-US" sz="1750" dirty="0"/>
-          </a:p>
-        </p:txBody>
-      </p:sp>
-    </p:spTree>
-  </p:cSld>
-  <p:clrMapOvr>
-    <a:masterClrMapping/>
-  </p:clrMapOvr>
-</p:sld>
-</file>
-
-<file path=ppt/slides/slide6.xml><?xml version="1.0" encoding="utf-8"?>
-<p:sld xmlns:a="http://schemas.openxmlformats.org/drawingml/2006/main" xmlns:r="http://schemas.openxmlformats.org/officeDocument/2006/relationships" xmlns:p="http://schemas.openxmlformats.org/presentationml/2006/main">
   <p:cSld name="Slide 6">
     <p:spTree>
       <p:nvGrpSpPr>
@@ -7323,7 +5839,7 @@
 </p:sld>
 </file>
 
-<file path=ppt/slides/slide7.xml><?xml version="1.0" encoding="utf-8"?>
+<file path=ppt/slides/slide6.xml><?xml version="1.0" encoding="utf-8"?>
 <p:sld xmlns:a="http://schemas.openxmlformats.org/drawingml/2006/main" xmlns:r="http://schemas.openxmlformats.org/officeDocument/2006/relationships" xmlns:p="http://schemas.openxmlformats.org/presentationml/2006/main">
   <p:cSld name="Slide 7">
     <p:spTree>
@@ -7786,7 +6302,7 @@
               <a:buChar char="•"/>
             </a:pPr>
             <a:r>
-              <a:rPr lang="en-US" sz="1750" dirty="0">
+              <a:rPr lang="en-US" sz="1750" dirty="0" err="1">
                 <a:solidFill>
                   <a:srgbClr val="E5DCE6"/>
                 </a:solidFill>
@@ -7794,7 +6310,18 @@
                 <a:ea typeface="Montserrat" pitchFamily="34" charset="-122"/>
                 <a:cs typeface="Montserrat" pitchFamily="34" charset="-120"/>
               </a:rPr>
-              <a:t>Hürden bei PostgreSQL-Integration</a:t>
+              <a:t>Probleme</a:t>
+            </a:r>
+            <a:r>
+              <a:rPr lang="en-US" sz="1750" dirty="0">
+                <a:solidFill>
+                  <a:srgbClr val="E5DCE6"/>
+                </a:solidFill>
+                <a:latin typeface="Montserrat" pitchFamily="34" charset="0"/>
+                <a:ea typeface="Montserrat" pitchFamily="34" charset="-122"/>
+                <a:cs typeface="Montserrat" pitchFamily="34" charset="-120"/>
+              </a:rPr>
+              <a:t> bei PostgreSQL-Integration</a:t>
             </a:r>
             <a:endParaRPr lang="en-US" sz="1750" dirty="0"/>
           </a:p>
@@ -7851,7 +6378,7 @@
 </p:sld>
 </file>
 
-<file path=ppt/slides/slide8.xml><?xml version="1.0" encoding="utf-8"?>
+<file path=ppt/slides/slide7.xml><?xml version="1.0" encoding="utf-8"?>
 <p:sld xmlns:a="http://schemas.openxmlformats.org/drawingml/2006/main" xmlns:r="http://schemas.openxmlformats.org/officeDocument/2006/relationships" xmlns:p="http://schemas.openxmlformats.org/presentationml/2006/main">
   <p:cSld name="Slide 8">
     <p:spTree>
@@ -8235,7 +6762,7 @@
               <a:buNone/>
             </a:pPr>
             <a:r>
-              <a:rPr lang="en-US" sz="1600" dirty="0">
+              <a:rPr lang="en-US" sz="1600" dirty="0" err="1">
                 <a:solidFill>
                   <a:srgbClr val="E5DCE6"/>
                 </a:solidFill>
@@ -8243,7 +6770,40 @@
                 <a:ea typeface="Montserrat" pitchFamily="34" charset="-122"/>
                 <a:cs typeface="Montserrat" pitchFamily="34" charset="-120"/>
               </a:rPr>
-              <a:t>Umgang mit realen Web-Technologien.</a:t>
+              <a:t>Umsetzung</a:t>
+            </a:r>
+            <a:r>
+              <a:rPr lang="en-US" sz="1600" dirty="0">
+                <a:solidFill>
+                  <a:srgbClr val="E5DCE6"/>
+                </a:solidFill>
+                <a:latin typeface="Montserrat" pitchFamily="34" charset="0"/>
+                <a:ea typeface="Montserrat" pitchFamily="34" charset="-122"/>
+                <a:cs typeface="Montserrat" pitchFamily="34" charset="-120"/>
+              </a:rPr>
+              <a:t> </a:t>
+            </a:r>
+            <a:r>
+              <a:rPr lang="en-US" sz="1600" dirty="0" err="1">
+                <a:solidFill>
+                  <a:srgbClr val="E5DCE6"/>
+                </a:solidFill>
+                <a:latin typeface="Montserrat" pitchFamily="34" charset="0"/>
+                <a:ea typeface="Montserrat" pitchFamily="34" charset="-122"/>
+                <a:cs typeface="Montserrat" pitchFamily="34" charset="-120"/>
+              </a:rPr>
+              <a:t>einer</a:t>
+            </a:r>
+            <a:r>
+              <a:rPr lang="en-US" sz="1600" dirty="0">
+                <a:solidFill>
+                  <a:srgbClr val="E5DCE6"/>
+                </a:solidFill>
+                <a:latin typeface="Montserrat" pitchFamily="34" charset="0"/>
+                <a:ea typeface="Montserrat" pitchFamily="34" charset="-122"/>
+                <a:cs typeface="Montserrat" pitchFamily="34" charset="-120"/>
+              </a:rPr>
+              <a:t> Web-App</a:t>
             </a:r>
             <a:endParaRPr lang="en-US" sz="1600" dirty="0"/>
           </a:p>
@@ -9081,7 +7641,7 @@
 </p:sld>
 </file>
 
-<file path=ppt/slides/slide9.xml><?xml version="1.0" encoding="utf-8"?>
+<file path=ppt/slides/slide8.xml><?xml version="1.0" encoding="utf-8"?>
 <p:sld xmlns:a="http://schemas.openxmlformats.org/drawingml/2006/main" xmlns:r="http://schemas.openxmlformats.org/officeDocument/2006/relationships" xmlns:p="http://schemas.openxmlformats.org/presentationml/2006/main">
   <p:cSld name="Slide 9">
     <p:spTree>
@@ -9628,6 +8188,234 @@
         </p:txBody>
       </p:sp>
     </p:spTree>
+  </p:cSld>
+  <p:clrMapOvr>
+    <a:masterClrMapping/>
+  </p:clrMapOvr>
+</p:sld>
+</file>
+
+<file path=ppt/slides/slide9.xml><?xml version="1.0" encoding="utf-8"?>
+<p:sld xmlns:a="http://schemas.openxmlformats.org/drawingml/2006/main" xmlns:r="http://schemas.openxmlformats.org/officeDocument/2006/relationships" xmlns:p="http://schemas.openxmlformats.org/presentationml/2006/main">
+  <p:cSld>
+    <p:spTree>
+      <p:nvGrpSpPr>
+        <p:cNvPr id="1" name="">
+          <a:extLst>
+            <a:ext uri="{FF2B5EF4-FFF2-40B4-BE49-F238E27FC236}">
+              <a16:creationId xmlns:a16="http://schemas.microsoft.com/office/drawing/2014/main" id="{A6A7A71E-71AA-15CC-763F-4E1C0CFBA3AA}"/>
+            </a:ext>
+          </a:extLst>
+        </p:cNvPr>
+        <p:cNvGrpSpPr/>
+        <p:nvPr/>
+      </p:nvGrpSpPr>
+      <p:grpSpPr>
+        <a:xfrm>
+          <a:off x="0" y="0"/>
+          <a:ext cx="0" cy="0"/>
+          <a:chOff x="0" y="0"/>
+          <a:chExt cx="0" cy="0"/>
+        </a:xfrm>
+      </p:grpSpPr>
+      <p:pic>
+        <p:nvPicPr>
+          <p:cNvPr id="2" name="Image 0" descr="preencoded.png">
+            <a:extLst>
+              <a:ext uri="{FF2B5EF4-FFF2-40B4-BE49-F238E27FC236}">
+                <a16:creationId xmlns:a16="http://schemas.microsoft.com/office/drawing/2014/main" id="{AAA44F12-4B81-B4B2-2A73-0731C4FB3F5D}"/>
+              </a:ext>
+            </a:extLst>
+          </p:cNvPr>
+          <p:cNvPicPr>
+            <a:picLocks noChangeAspect="1"/>
+          </p:cNvPicPr>
+          <p:nvPr/>
+        </p:nvPicPr>
+        <p:blipFill>
+          <a:blip r:embed="rId3"/>
+          <a:stretch>
+            <a:fillRect/>
+          </a:stretch>
+        </p:blipFill>
+        <p:spPr>
+          <a:xfrm>
+            <a:off x="0" y="0"/>
+            <a:ext cx="5760720" cy="8229600"/>
+          </a:xfrm>
+          <a:prstGeom prst="rect">
+            <a:avLst/>
+          </a:prstGeom>
+        </p:spPr>
+      </p:pic>
+      <p:sp>
+        <p:nvSpPr>
+          <p:cNvPr id="3" name="Text 0">
+            <a:extLst>
+              <a:ext uri="{FF2B5EF4-FFF2-40B4-BE49-F238E27FC236}">
+                <a16:creationId xmlns:a16="http://schemas.microsoft.com/office/drawing/2014/main" id="{E59F3CA9-B99C-3455-C38E-116BC05ED180}"/>
+              </a:ext>
+            </a:extLst>
+          </p:cNvPr>
+          <p:cNvSpPr/>
+          <p:nvPr/>
+        </p:nvSpPr>
+        <p:spPr>
+          <a:xfrm>
+            <a:off x="5760720" y="3567639"/>
+            <a:ext cx="8898850" cy="2126337"/>
+          </a:xfrm>
+          <a:prstGeom prst="rect">
+            <a:avLst/>
+          </a:prstGeom>
+          <a:noFill/>
+          <a:ln/>
+        </p:spPr>
+        <p:txBody>
+          <a:bodyPr wrap="square" lIns="0" tIns="0" rIns="0" bIns="0" rtlCol="0" anchor="t"/>
+          <a:lstStyle/>
+          <a:p>
+            <a:pPr marL="0" indent="0" algn="l">
+              <a:lnSpc>
+                <a:spcPts val="5550"/>
+              </a:lnSpc>
+              <a:buNone/>
+            </a:pPr>
+            <a:r>
+              <a:rPr lang="en-US" sz="4450" b="1" dirty="0">
+                <a:solidFill>
+                  <a:srgbClr val="EEAEF6"/>
+                </a:solidFill>
+                <a:latin typeface="Bricolage Grotesque Extra Bold" pitchFamily="34" charset="0"/>
+                <a:ea typeface="Bricolage Grotesque Extra Bold" pitchFamily="34" charset="-122"/>
+                <a:cs typeface="Bricolage Grotesque Extra Bold" pitchFamily="34" charset="-120"/>
+              </a:rPr>
+              <a:t>Danke für </a:t>
+            </a:r>
+            <a:r>
+              <a:rPr lang="en-US" sz="4450" b="1" dirty="0" err="1">
+                <a:solidFill>
+                  <a:srgbClr val="EEAEF6"/>
+                </a:solidFill>
+                <a:latin typeface="Bricolage Grotesque Extra Bold" pitchFamily="34" charset="0"/>
+                <a:ea typeface="Bricolage Grotesque Extra Bold" pitchFamily="34" charset="-122"/>
+                <a:cs typeface="Bricolage Grotesque Extra Bold" pitchFamily="34" charset="-120"/>
+              </a:rPr>
+              <a:t>eure</a:t>
+            </a:r>
+            <a:r>
+              <a:rPr lang="en-US" sz="4450" b="1" dirty="0">
+                <a:solidFill>
+                  <a:srgbClr val="EEAEF6"/>
+                </a:solidFill>
+                <a:latin typeface="Bricolage Grotesque Extra Bold" pitchFamily="34" charset="0"/>
+                <a:ea typeface="Bricolage Grotesque Extra Bold" pitchFamily="34" charset="-122"/>
+                <a:cs typeface="Bricolage Grotesque Extra Bold" pitchFamily="34" charset="-120"/>
+              </a:rPr>
+              <a:t> </a:t>
+            </a:r>
+            <a:r>
+              <a:rPr lang="en-US" sz="4450" b="1" dirty="0" err="1">
+                <a:solidFill>
+                  <a:srgbClr val="EEAEF6"/>
+                </a:solidFill>
+                <a:latin typeface="Bricolage Grotesque Extra Bold" pitchFamily="34" charset="0"/>
+                <a:ea typeface="Bricolage Grotesque Extra Bold" pitchFamily="34" charset="-122"/>
+                <a:cs typeface="Bricolage Grotesque Extra Bold" pitchFamily="34" charset="-120"/>
+              </a:rPr>
+              <a:t>Aufmerksamkeit</a:t>
+            </a:r>
+            <a:r>
+              <a:rPr lang="en-US" sz="4450" b="1" dirty="0">
+                <a:solidFill>
+                  <a:srgbClr val="EEAEF6"/>
+                </a:solidFill>
+                <a:latin typeface="Bricolage Grotesque Extra Bold" pitchFamily="34" charset="0"/>
+                <a:ea typeface="Bricolage Grotesque Extra Bold" pitchFamily="34" charset="-122"/>
+                <a:cs typeface="Bricolage Grotesque Extra Bold" pitchFamily="34" charset="-120"/>
+              </a:rPr>
+              <a:t> </a:t>
+            </a:r>
+            <a:r>
+              <a:rPr lang="de-CH" sz="4450" b="1" dirty="0">
+                <a:solidFill>
+                  <a:srgbClr val="EEAEF6"/>
+                </a:solidFill>
+                <a:latin typeface="Bricolage Grotesque Extra Bold" pitchFamily="34" charset="0"/>
+                <a:ea typeface="Bricolage Grotesque Extra Bold" pitchFamily="34" charset="-122"/>
+                <a:cs typeface="Bricolage Grotesque Extra Bold" pitchFamily="34" charset="-120"/>
+              </a:rPr>
+              <a:t>!</a:t>
+            </a:r>
+            <a:endParaRPr lang="en-US" sz="4450" dirty="0"/>
+          </a:p>
+        </p:txBody>
+      </p:sp>
+      <p:sp>
+        <p:nvSpPr>
+          <p:cNvPr id="4" name="Text 1">
+            <a:extLst>
+              <a:ext uri="{FF2B5EF4-FFF2-40B4-BE49-F238E27FC236}">
+                <a16:creationId xmlns:a16="http://schemas.microsoft.com/office/drawing/2014/main" id="{5F094045-6829-BA45-6581-DFE8681D323C}"/>
+              </a:ext>
+            </a:extLst>
+          </p:cNvPr>
+          <p:cNvSpPr/>
+          <p:nvPr/>
+        </p:nvSpPr>
+        <p:spPr>
+          <a:xfrm>
+            <a:off x="9283272" y="4267904"/>
+            <a:ext cx="7556421" cy="362903"/>
+          </a:xfrm>
+          <a:prstGeom prst="rect">
+            <a:avLst/>
+          </a:prstGeom>
+          <a:noFill/>
+          <a:ln/>
+        </p:spPr>
+        <p:txBody>
+          <a:bodyPr wrap="none" lIns="0" tIns="0" rIns="0" bIns="0" rtlCol="0" anchor="t"/>
+          <a:lstStyle/>
+          <a:p>
+            <a:pPr marL="0" indent="0" algn="l">
+              <a:lnSpc>
+                <a:spcPts val="2850"/>
+              </a:lnSpc>
+              <a:buNone/>
+            </a:pPr>
+            <a:r>
+              <a:rPr lang="en-US" sz="1750" dirty="0" err="1">
+                <a:solidFill>
+                  <a:srgbClr val="E5DCE6"/>
+                </a:solidFill>
+                <a:latin typeface="Montserrat" pitchFamily="34" charset="0"/>
+                <a:ea typeface="Montserrat" pitchFamily="34" charset="-122"/>
+                <a:cs typeface="Montserrat" pitchFamily="34" charset="-120"/>
+              </a:rPr>
+              <a:t>Fragen</a:t>
+            </a:r>
+            <a:r>
+              <a:rPr lang="en-US" sz="1750" dirty="0">
+                <a:solidFill>
+                  <a:srgbClr val="E5DCE6"/>
+                </a:solidFill>
+                <a:latin typeface="Montserrat" pitchFamily="34" charset="0"/>
+                <a:ea typeface="Montserrat" pitchFamily="34" charset="-122"/>
+                <a:cs typeface="Montserrat" pitchFamily="34" charset="-120"/>
+              </a:rPr>
+              <a:t>?</a:t>
+            </a:r>
+            <a:endParaRPr lang="en-US" sz="1750" dirty="0"/>
+          </a:p>
+        </p:txBody>
+      </p:sp>
+    </p:spTree>
+    <p:extLst>
+      <p:ext uri="{BB962C8B-B14F-4D97-AF65-F5344CB8AC3E}">
+        <p14:creationId xmlns:p14="http://schemas.microsoft.com/office/powerpoint/2010/main" val="876237768"/>
+      </p:ext>
+    </p:extLst>
   </p:cSld>
   <p:clrMapOvr>
     <a:masterClrMapping/>

</xml_diff>